<commit_message>
Deploy hylandtechoutreach/ucs to github.com/hylandtechoutreach/ucs.git:gh-pages
</commit_message>
<xml_diff>
--- a/Session2Twine/InteractiveStorytelling.pptx
+++ b/Session2Twine/InteractiveStorytelling.pptx
@@ -215,7 +215,7 @@
           <a:p>
             <a:fld id="{19104133-B5B0-4351-8158-4F0E5EB1E2BF}" type="datetimeFigureOut">
               <a:rPr lang="en-US" smtClean="0"/>
-              <a:t>2/23/2021</a:t>
+              <a:t>3/30/2021</a:t>
             </a:fld>
             <a:endParaRPr lang="en-US"/>
           </a:p>
@@ -1476,7 +1476,7 @@
             <a:fld id="{1C2D31DE-C454-491C-B5C3-F097855E3DF7}" type="datetime4">
               <a:rPr lang="en-US" smtClean="0"/>
               <a:pPr/>
-              <a:t>February 23, 2021</a:t>
+              <a:t>March 30, 2021</a:t>
             </a:fld>
             <a:endParaRPr lang="en-US" dirty="0"/>
           </a:p>
@@ -4868,7 +4868,7 @@
           <a:p>
             <a:fld id="{5958763E-B898-436D-883D-03711491D54A}" type="datetimeFigureOut">
               <a:rPr lang="en-US" smtClean="0"/>
-              <a:t>2/23/2021</a:t>
+              <a:t>3/30/2021</a:t>
             </a:fld>
             <a:endParaRPr lang="en-US"/>
           </a:p>
@@ -5061,7 +5061,7 @@
           <a:p>
             <a:fld id="{5958763E-B898-436D-883D-03711491D54A}" type="datetimeFigureOut">
               <a:rPr lang="en-US" smtClean="0"/>
-              <a:t>2/23/2021</a:t>
+              <a:t>3/30/2021</a:t>
             </a:fld>
             <a:endParaRPr lang="en-US"/>
           </a:p>
@@ -5311,7 +5311,7 @@
           <a:p>
             <a:fld id="{5958763E-B898-436D-883D-03711491D54A}" type="datetimeFigureOut">
               <a:rPr lang="en-US" smtClean="0"/>
-              <a:t>2/23/2021</a:t>
+              <a:t>3/30/2021</a:t>
             </a:fld>
             <a:endParaRPr lang="en-US"/>
           </a:p>
@@ -5659,7 +5659,7 @@
           <a:p>
             <a:fld id="{5958763E-B898-436D-883D-03711491D54A}" type="datetimeFigureOut">
               <a:rPr lang="en-US" smtClean="0"/>
-              <a:t>2/23/2021</a:t>
+              <a:t>3/30/2021</a:t>
             </a:fld>
             <a:endParaRPr lang="en-US"/>
           </a:p>
@@ -6075,7 +6075,7 @@
           <a:p>
             <a:fld id="{5958763E-B898-436D-883D-03711491D54A}" type="datetimeFigureOut">
               <a:rPr lang="en-US" smtClean="0"/>
-              <a:t>2/23/2021</a:t>
+              <a:t>3/30/2021</a:t>
             </a:fld>
             <a:endParaRPr lang="en-US"/>
           </a:p>
@@ -6576,7 +6576,7 @@
           <a:p>
             <a:fld id="{5958763E-B898-436D-883D-03711491D54A}" type="datetimeFigureOut">
               <a:rPr lang="en-US" smtClean="0"/>
-              <a:t>2/23/2021</a:t>
+              <a:t>3/30/2021</a:t>
             </a:fld>
             <a:endParaRPr lang="en-US"/>
           </a:p>
@@ -7027,7 +7027,7 @@
           <a:p>
             <a:fld id="{5958763E-B898-436D-883D-03711491D54A}" type="datetimeFigureOut">
               <a:rPr lang="en-US" smtClean="0"/>
-              <a:t>2/23/2021</a:t>
+              <a:t>3/30/2021</a:t>
             </a:fld>
             <a:endParaRPr lang="en-US"/>
           </a:p>
@@ -7638,7 +7638,7 @@
           <a:p>
             <a:fld id="{5958763E-B898-436D-883D-03711491D54A}" type="datetimeFigureOut">
               <a:rPr lang="en-US" smtClean="0"/>
-              <a:t>2/23/2021</a:t>
+              <a:t>3/30/2021</a:t>
             </a:fld>
             <a:endParaRPr lang="en-US"/>
           </a:p>
@@ -8409,7 +8409,7 @@
           <a:p>
             <a:fld id="{5958763E-B898-436D-883D-03711491D54A}" type="datetimeFigureOut">
               <a:rPr lang="en-US" smtClean="0"/>
-              <a:t>2/23/2021</a:t>
+              <a:t>3/30/2021</a:t>
             </a:fld>
             <a:endParaRPr lang="en-US"/>
           </a:p>
@@ -8513,7 +8513,7 @@
           <a:p>
             <a:fld id="{5958763E-B898-436D-883D-03711491D54A}" type="datetimeFigureOut">
               <a:rPr lang="en-US" smtClean="0"/>
-              <a:t>2/23/2021</a:t>
+              <a:t>3/30/2021</a:t>
             </a:fld>
             <a:endParaRPr lang="en-US"/>
           </a:p>
@@ -8840,7 +8840,7 @@
             <a:fld id="{1C2D31DE-C454-491C-B5C3-F097855E3DF7}" type="datetime4">
               <a:rPr lang="en-US" smtClean="0"/>
               <a:pPr/>
-              <a:t>February 23, 2021</a:t>
+              <a:t>March 30, 2021</a:t>
             </a:fld>
             <a:endParaRPr lang="en-US" dirty="0"/>
           </a:p>
@@ -11992,7 +11992,7 @@
           <a:p>
             <a:fld id="{5958763E-B898-436D-883D-03711491D54A}" type="datetimeFigureOut">
               <a:rPr lang="en-US" smtClean="0"/>
-              <a:t>2/23/2021</a:t>
+              <a:t>3/30/2021</a:t>
             </a:fld>
             <a:endParaRPr lang="en-US"/>
           </a:p>
@@ -12116,7 +12116,7 @@
           <a:p>
             <a:fld id="{5958763E-B898-436D-883D-03711491D54A}" type="datetimeFigureOut">
               <a:rPr lang="en-US" smtClean="0"/>
-              <a:t>2/23/2021</a:t>
+              <a:t>3/30/2021</a:t>
             </a:fld>
             <a:endParaRPr lang="en-US"/>
           </a:p>
@@ -12240,7 +12240,7 @@
           <a:p>
             <a:fld id="{5958763E-B898-436D-883D-03711491D54A}" type="datetimeFigureOut">
               <a:rPr lang="en-US" smtClean="0"/>
-              <a:t>2/23/2021</a:t>
+              <a:t>3/30/2021</a:t>
             </a:fld>
             <a:endParaRPr lang="en-US"/>
           </a:p>
@@ -12364,7 +12364,7 @@
           <a:p>
             <a:fld id="{5958763E-B898-436D-883D-03711491D54A}" type="datetimeFigureOut">
               <a:rPr lang="en-US" smtClean="0"/>
-              <a:t>2/23/2021</a:t>
+              <a:t>3/30/2021</a:t>
             </a:fld>
             <a:endParaRPr lang="en-US"/>
           </a:p>
@@ -12488,7 +12488,7 @@
           <a:p>
             <a:fld id="{5958763E-B898-436D-883D-03711491D54A}" type="datetimeFigureOut">
               <a:rPr lang="en-US" smtClean="0"/>
-              <a:t>2/23/2021</a:t>
+              <a:t>3/30/2021</a:t>
             </a:fld>
             <a:endParaRPr lang="en-US"/>
           </a:p>
@@ -12612,7 +12612,7 @@
           <a:p>
             <a:fld id="{5958763E-B898-436D-883D-03711491D54A}" type="datetimeFigureOut">
               <a:rPr lang="en-US" smtClean="0"/>
-              <a:t>2/23/2021</a:t>
+              <a:t>3/30/2021</a:t>
             </a:fld>
             <a:endParaRPr lang="en-US"/>
           </a:p>
@@ -12736,7 +12736,7 @@
           <a:p>
             <a:fld id="{5958763E-B898-436D-883D-03711491D54A}" type="datetimeFigureOut">
               <a:rPr lang="en-US" smtClean="0"/>
-              <a:t>2/23/2021</a:t>
+              <a:t>3/30/2021</a:t>
             </a:fld>
             <a:endParaRPr lang="en-US"/>
           </a:p>
@@ -12860,7 +12860,7 @@
           <a:p>
             <a:fld id="{5958763E-B898-436D-883D-03711491D54A}" type="datetimeFigureOut">
               <a:rPr lang="en-US" smtClean="0"/>
-              <a:t>2/23/2021</a:t>
+              <a:t>3/30/2021</a:t>
             </a:fld>
             <a:endParaRPr lang="en-US"/>
           </a:p>
@@ -12993,7 +12993,7 @@
           <a:p>
             <a:fld id="{5958763E-B898-436D-883D-03711491D54A}" type="datetimeFigureOut">
               <a:rPr lang="en-US" smtClean="0"/>
-              <a:t>2/23/2021</a:t>
+              <a:t>3/30/2021</a:t>
             </a:fld>
             <a:endParaRPr lang="en-US"/>
           </a:p>
@@ -16332,7 +16332,7 @@
             <a:fld id="{1C2D31DE-C454-491C-B5C3-F097855E3DF7}" type="datetime4">
               <a:rPr lang="en-US" smtClean="0"/>
               <a:pPr/>
-              <a:t>February 23, 2021</a:t>
+              <a:t>March 30, 2021</a:t>
             </a:fld>
             <a:endParaRPr lang="en-US" dirty="0"/>
           </a:p>
@@ -28568,7 +28568,7 @@
           <a:p>
             <a:fld id="{5958763E-B898-436D-883D-03711491D54A}" type="datetimeFigureOut">
               <a:rPr lang="en-US" smtClean="0"/>
-              <a:t>2/23/2021</a:t>
+              <a:t>3/30/2021</a:t>
             </a:fld>
             <a:endParaRPr lang="en-US"/>
           </a:p>
@@ -28970,7 +28970,7 @@
           <a:p>
             <a:fld id="{5958763E-B898-436D-883D-03711491D54A}" type="datetimeFigureOut">
               <a:rPr lang="en-US" smtClean="0"/>
-              <a:t>2/23/2021</a:t>
+              <a:t>3/30/2021</a:t>
             </a:fld>
             <a:endParaRPr lang="en-US"/>
           </a:p>
@@ -29264,7 +29264,7 @@
           <a:p>
             <a:fld id="{5958763E-B898-436D-883D-03711491D54A}" type="datetimeFigureOut">
               <a:rPr lang="en-US" smtClean="0"/>
-              <a:t>2/23/2021</a:t>
+              <a:t>3/30/2021</a:t>
             </a:fld>
             <a:endParaRPr lang="en-US"/>
           </a:p>
@@ -29465,7 +29465,7 @@
           <a:p>
             <a:fld id="{5958763E-B898-436D-883D-03711491D54A}" type="datetimeFigureOut">
               <a:rPr lang="en-US" smtClean="0"/>
-              <a:t>2/23/2021</a:t>
+              <a:t>3/30/2021</a:t>
             </a:fld>
             <a:endParaRPr lang="en-US"/>
           </a:p>
@@ -29726,7 +29726,7 @@
           <a:p>
             <a:fld id="{5958763E-B898-436D-883D-03711491D54A}" type="datetimeFigureOut">
               <a:rPr lang="en-US" smtClean="0"/>
-              <a:t>2/23/2021</a:t>
+              <a:t>3/30/2021</a:t>
             </a:fld>
             <a:endParaRPr lang="en-US"/>
           </a:p>
@@ -30234,7 +30234,7 @@
           <a:p>
             <a:fld id="{5958763E-B898-436D-883D-03711491D54A}" type="datetimeFigureOut">
               <a:rPr lang="en-US" smtClean="0"/>
-              <a:t>2/23/2021</a:t>
+              <a:t>3/30/2021</a:t>
             </a:fld>
             <a:endParaRPr lang="en-US"/>
           </a:p>
@@ -30713,7 +30713,7 @@
           <a:p>
             <a:fld id="{5958763E-B898-436D-883D-03711491D54A}" type="datetimeFigureOut">
               <a:rPr lang="en-US" smtClean="0"/>
-              <a:t>2/23/2021</a:t>
+              <a:t>3/30/2021</a:t>
             </a:fld>
             <a:endParaRPr lang="en-US"/>
           </a:p>
@@ -31532,7 +31532,7 @@
           <a:p>
             <a:fld id="{5958763E-B898-436D-883D-03711491D54A}" type="datetimeFigureOut">
               <a:rPr lang="en-US" smtClean="0"/>
-              <a:t>2/23/2021</a:t>
+              <a:t>3/30/2021</a:t>
             </a:fld>
             <a:endParaRPr lang="en-US"/>
           </a:p>
@@ -31733,7 +31733,7 @@
           <a:p>
             <a:fld id="{5958763E-B898-436D-883D-03711491D54A}" type="datetimeFigureOut">
               <a:rPr lang="en-US" smtClean="0"/>
-              <a:t>2/23/2021</a:t>
+              <a:t>3/30/2021</a:t>
             </a:fld>
             <a:endParaRPr lang="en-US"/>
           </a:p>
@@ -32068,7 +32068,7 @@
           <a:p>
             <a:fld id="{5958763E-B898-436D-883D-03711491D54A}" type="datetimeFigureOut">
               <a:rPr lang="en-US" smtClean="0"/>
-              <a:t>2/23/2021</a:t>
+              <a:t>3/30/2021</a:t>
             </a:fld>
             <a:endParaRPr lang="en-US"/>
           </a:p>
@@ -32298,7 +32298,7 @@
           <a:p>
             <a:fld id="{5958763E-B898-436D-883D-03711491D54A}" type="datetimeFigureOut">
               <a:rPr lang="en-US" smtClean="0"/>
-              <a:t>2/23/2021</a:t>
+              <a:t>3/30/2021</a:t>
             </a:fld>
             <a:endParaRPr lang="en-US"/>
           </a:p>
@@ -32542,7 +32542,7 @@
           <a:p>
             <a:fld id="{5958763E-B898-436D-883D-03711491D54A}" type="datetimeFigureOut">
               <a:rPr lang="en-US" smtClean="0"/>
-              <a:t>2/23/2021</a:t>
+              <a:t>3/30/2021</a:t>
             </a:fld>
             <a:endParaRPr lang="en-US"/>
           </a:p>
@@ -33090,7 +33090,7 @@
         <p:spPr>
           <a:xfrm>
             <a:off x="381000" y="3429000"/>
-            <a:ext cx="3082895" cy="553998"/>
+            <a:ext cx="4185954" cy="553998"/>
           </a:xfrm>
         </p:spPr>
         <p:txBody>
@@ -33098,9 +33098,10 @@
           <a:lstStyle/>
           <a:p>
             <a:r>
-              <a:rPr lang="en-US" dirty="0"/>
-              <a:t>Hy-Tech Camp</a:t>
+              <a:rPr lang="en-US"/>
+              <a:t>Workshop Session</a:t>
             </a:r>
+            <a:endParaRPr lang="en-US" dirty="0"/>
           </a:p>
         </p:txBody>
       </p:sp>

</xml_diff>